<commit_message>
Hunter's additions to the PPT
added 3 slides. 2 for triang alg. 1 for wii circuit board
</commit_message>
<xml_diff>
--- a/docs/Cycle 1/Cycle1Presentation.pptx
+++ b/docs/Cycle 1/Cycle1Presentation.pptx
@@ -10,31 +10,33 @@
     <p:sldId id="261" r:id="rId4"/>
     <p:sldId id="260" r:id="rId5"/>
     <p:sldId id="263" r:id="rId6"/>
-    <p:sldId id="262" r:id="rId7"/>
-    <p:sldId id="264" r:id="rId8"/>
-    <p:sldId id="258" r:id="rId9"/>
-    <p:sldId id="259" r:id="rId10"/>
+    <p:sldId id="266" r:id="rId7"/>
+    <p:sldId id="262" r:id="rId8"/>
+    <p:sldId id="265" r:id="rId9"/>
+    <p:sldId id="264" r:id="rId10"/>
+    <p:sldId id="258" r:id="rId11"/>
+    <p:sldId id="259" r:id="rId12"/>
   </p:sldIdLst>
   <p:sldSz cx="9144000" cy="6858000" type="screen4x3"/>
   <p:notesSz cx="6858000" cy="9144000"/>
   <p:embeddedFontLst>
     <p:embeddedFont>
-      <p:font typeface="Postmaster" panose="020B0604020202020204"/>
-      <p:regular r:id="rId11"/>
+      <p:font typeface="Arial Narrow" panose="020B0606020202030204" pitchFamily="34" charset="0"/>
+      <p:regular r:id="rId13"/>
+      <p:bold r:id="rId14"/>
+      <p:italic r:id="rId15"/>
+      <p:boldItalic r:id="rId16"/>
     </p:embeddedFont>
     <p:embeddedFont>
       <p:font typeface="Calibri" panose="020F0502020204030204" pitchFamily="34" charset="0"/>
-      <p:regular r:id="rId12"/>
-      <p:bold r:id="rId13"/>
-      <p:italic r:id="rId14"/>
-      <p:boldItalic r:id="rId15"/>
+      <p:regular r:id="rId17"/>
+      <p:bold r:id="rId18"/>
+      <p:italic r:id="rId19"/>
+      <p:boldItalic r:id="rId20"/>
     </p:embeddedFont>
     <p:embeddedFont>
-      <p:font typeface="Arial Narrow" panose="020B0606020202030204" pitchFamily="34" charset="0"/>
-      <p:regular r:id="rId16"/>
-      <p:bold r:id="rId17"/>
-      <p:italic r:id="rId18"/>
-      <p:boldItalic r:id="rId19"/>
+      <p:font typeface="Postmaster" pitchFamily="2" charset="0"/>
+      <p:regular r:id="rId21"/>
     </p:embeddedFont>
   </p:embeddedFontLst>
   <p:defaultTextStyle>
@@ -134,7 +136,7 @@
   </p:defaultTextStyle>
   <p:extLst>
     <p:ext uri="{EFAFB233-063F-42B5-8137-9DF3F51BA10A}">
-      <p15:sldGuideLst xmlns:p15="http://schemas.microsoft.com/office/powerpoint/2012/main">
+      <p15:sldGuideLst xmlns:p15="http://schemas.microsoft.com/office/powerpoint/2012/main" xmlns="">
         <p15:guide id="1" orient="horz" pos="2160">
           <p15:clr>
             <a:srgbClr val="A4A3A4"/>
@@ -4958,6 +4960,225 @@
 </p:sld>
 </file>
 
+<file path=ppt/slides/slide10.xml><?xml version="1.0" encoding="utf-8"?>
+<p:sld xmlns:a="http://schemas.openxmlformats.org/drawingml/2006/main" xmlns:r="http://schemas.openxmlformats.org/officeDocument/2006/relationships" xmlns:p="http://schemas.openxmlformats.org/presentationml/2006/main">
+  <p:cSld>
+    <p:spTree>
+      <p:nvGrpSpPr>
+        <p:cNvPr id="1" name=""/>
+        <p:cNvGrpSpPr/>
+        <p:nvPr/>
+      </p:nvGrpSpPr>
+      <p:grpSpPr>
+        <a:xfrm>
+          <a:off x="0" y="0"/>
+          <a:ext cx="0" cy="0"/>
+          <a:chOff x="0" y="0"/>
+          <a:chExt cx="0" cy="0"/>
+        </a:xfrm>
+      </p:grpSpPr>
+      <p:sp>
+        <p:nvSpPr>
+          <p:cNvPr id="2" name="Title 1"/>
+          <p:cNvSpPr>
+            <a:spLocks noGrp="1"/>
+          </p:cNvSpPr>
+          <p:nvPr>
+            <p:ph type="title"/>
+          </p:nvPr>
+        </p:nvSpPr>
+        <p:spPr/>
+        <p:txBody>
+          <a:bodyPr/>
+          <a:lstStyle/>
+          <a:p>
+            <a:pPr algn="ctr"/>
+            <a:r>
+              <a:rPr lang="en-US" dirty="0" smtClean="0"/>
+              <a:t>Budget</a:t>
+            </a:r>
+            <a:endParaRPr lang="en-US" dirty="0"/>
+          </a:p>
+        </p:txBody>
+      </p:sp>
+      <p:sp>
+        <p:nvSpPr>
+          <p:cNvPr id="3" name="Content Placeholder 2"/>
+          <p:cNvSpPr>
+            <a:spLocks noGrp="1"/>
+          </p:cNvSpPr>
+          <p:nvPr>
+            <p:ph sz="quarter" idx="13"/>
+          </p:nvPr>
+        </p:nvSpPr>
+        <p:spPr/>
+        <p:txBody>
+          <a:bodyPr>
+            <a:normAutofit/>
+          </a:bodyPr>
+          <a:lstStyle/>
+          <a:p>
+            <a:r>
+              <a:rPr lang="en-US" sz="2400" dirty="0" smtClean="0"/>
+              <a:t>Total budget of $50 per team member</a:t>
+            </a:r>
+          </a:p>
+          <a:p>
+            <a:r>
+              <a:rPr lang="en-US" sz="2400" dirty="0" smtClean="0"/>
+              <a:t>Estimated costs: ~$225</a:t>
+            </a:r>
+          </a:p>
+          <a:p>
+            <a:r>
+              <a:rPr lang="en-US" sz="2400" dirty="0" smtClean="0"/>
+              <a:t>Unexpected costs: ~$25</a:t>
+            </a:r>
+          </a:p>
+          <a:p>
+            <a:endParaRPr lang="en-US" sz="2400" dirty="0"/>
+          </a:p>
+        </p:txBody>
+      </p:sp>
+    </p:spTree>
+    <p:extLst>
+      <p:ext uri="{BB962C8B-B14F-4D97-AF65-F5344CB8AC3E}">
+        <p14:creationId xmlns:p14="http://schemas.microsoft.com/office/powerpoint/2010/main" val="1111726868"/>
+      </p:ext>
+    </p:extLst>
+  </p:cSld>
+  <p:clrMapOvr>
+    <a:masterClrMapping/>
+  </p:clrMapOvr>
+  <p:timing>
+    <p:tnLst>
+      <p:par>
+        <p:cTn id="1" dur="indefinite" restart="never" nodeType="tmRoot"/>
+      </p:par>
+    </p:tnLst>
+  </p:timing>
+</p:sld>
+</file>
+
+<file path=ppt/slides/slide11.xml><?xml version="1.0" encoding="utf-8"?>
+<p:sld xmlns:a="http://schemas.openxmlformats.org/drawingml/2006/main" xmlns:r="http://schemas.openxmlformats.org/officeDocument/2006/relationships" xmlns:p="http://schemas.openxmlformats.org/presentationml/2006/main">
+  <p:cSld>
+    <p:spTree>
+      <p:nvGrpSpPr>
+        <p:cNvPr id="1" name=""/>
+        <p:cNvGrpSpPr/>
+        <p:nvPr/>
+      </p:nvGrpSpPr>
+      <p:grpSpPr>
+        <a:xfrm>
+          <a:off x="0" y="0"/>
+          <a:ext cx="0" cy="0"/>
+          <a:chOff x="0" y="0"/>
+          <a:chExt cx="0" cy="0"/>
+        </a:xfrm>
+      </p:grpSpPr>
+      <p:sp>
+        <p:nvSpPr>
+          <p:cNvPr id="2" name="Title 1"/>
+          <p:cNvSpPr>
+            <a:spLocks noGrp="1"/>
+          </p:cNvSpPr>
+          <p:nvPr>
+            <p:ph type="title"/>
+          </p:nvPr>
+        </p:nvSpPr>
+        <p:spPr/>
+        <p:txBody>
+          <a:bodyPr/>
+          <a:lstStyle/>
+          <a:p>
+            <a:pPr algn="ctr"/>
+            <a:r>
+              <a:rPr lang="en-US" dirty="0" smtClean="0"/>
+              <a:t>timeline</a:t>
+            </a:r>
+            <a:endParaRPr lang="en-US" dirty="0"/>
+          </a:p>
+        </p:txBody>
+      </p:sp>
+      <p:sp>
+        <p:nvSpPr>
+          <p:cNvPr id="3" name="Content Placeholder 2"/>
+          <p:cNvSpPr>
+            <a:spLocks noGrp="1"/>
+          </p:cNvSpPr>
+          <p:nvPr>
+            <p:ph sz="quarter" idx="13"/>
+          </p:nvPr>
+        </p:nvSpPr>
+        <p:spPr/>
+        <p:txBody>
+          <a:bodyPr>
+            <a:normAutofit/>
+          </a:bodyPr>
+          <a:lstStyle/>
+          <a:p>
+            <a:r>
+              <a:rPr lang="en-US" sz="2400" dirty="0" smtClean="0"/>
+              <a:t>Proposal: January 22</a:t>
+            </a:r>
+          </a:p>
+          <a:p>
+            <a:r>
+              <a:rPr lang="en-US" sz="2400" dirty="0" smtClean="0"/>
+              <a:t>Cycle 1: March 6</a:t>
+            </a:r>
+          </a:p>
+          <a:p>
+            <a:pPr lvl="1"/>
+            <a:r>
+              <a:rPr lang="en-US" sz="2400" dirty="0" smtClean="0"/>
+              <a:t>Working control algorithm</a:t>
+            </a:r>
+          </a:p>
+          <a:p>
+            <a:r>
+              <a:rPr lang="en-US" sz="2400" dirty="0" smtClean="0"/>
+              <a:t>Cycle 2: April 25</a:t>
+            </a:r>
+          </a:p>
+          <a:p>
+            <a:pPr lvl="1"/>
+            <a:r>
+              <a:rPr lang="en-US" sz="2400" dirty="0" smtClean="0"/>
+              <a:t>Final design report by April 18</a:t>
+            </a:r>
+          </a:p>
+          <a:p>
+            <a:pPr lvl="1"/>
+            <a:r>
+              <a:rPr lang="en-US" sz="2400" dirty="0" smtClean="0"/>
+              <a:t>Senior Design Fair: April 25</a:t>
+            </a:r>
+            <a:endParaRPr lang="en-US" sz="2400" dirty="0"/>
+          </a:p>
+        </p:txBody>
+      </p:sp>
+    </p:spTree>
+    <p:extLst>
+      <p:ext uri="{BB962C8B-B14F-4D97-AF65-F5344CB8AC3E}">
+        <p14:creationId xmlns:p14="http://schemas.microsoft.com/office/powerpoint/2010/main" val="2327637867"/>
+      </p:ext>
+    </p:extLst>
+  </p:cSld>
+  <p:clrMapOvr>
+    <a:masterClrMapping/>
+  </p:clrMapOvr>
+  <p:timing>
+    <p:tnLst>
+      <p:par>
+        <p:cTn id="1" dur="indefinite" restart="never" nodeType="tmRoot"/>
+      </p:par>
+    </p:tnLst>
+  </p:timing>
+</p:sld>
+</file>
+
 <file path=ppt/slides/slide2.xml><?xml version="1.0" encoding="utf-8"?>
 <p:sld xmlns:a="http://schemas.openxmlformats.org/drawingml/2006/main" xmlns:r="http://schemas.openxmlformats.org/officeDocument/2006/relationships" xmlns:p="http://schemas.openxmlformats.org/presentationml/2006/main">
   <p:cSld>
@@ -5128,11 +5349,7 @@
           <a:p>
             <a:r>
               <a:rPr lang="en-US" sz="2400" dirty="0" smtClean="0"/>
-              <a:t>Created n</a:t>
-            </a:r>
-            <a:r>
-              <a:rPr lang="en-US" sz="2400" dirty="0" smtClean="0"/>
-              <a:t>ew Roll/Pitch mode</a:t>
+              <a:t>Created new Roll/Pitch mode</a:t>
             </a:r>
           </a:p>
           <a:p>
@@ -5141,7 +5358,6 @@
               <a:rPr lang="en-US" sz="2400" dirty="0" smtClean="0"/>
               <a:t>Sets IR flag to switch between GPS and camera error.</a:t>
             </a:r>
-            <a:endParaRPr lang="en-US" sz="2400" dirty="0" smtClean="0"/>
           </a:p>
           <a:p>
             <a:pPr lvl="1"/>
@@ -5178,7 +5394,6 @@
               <a:rPr lang="en-US" sz="2400" dirty="0" smtClean="0"/>
               <a:t> based on camera error.</a:t>
             </a:r>
-            <a:endParaRPr lang="en-US" sz="2400" dirty="0" smtClean="0"/>
           </a:p>
           <a:p>
             <a:pPr lvl="1"/>
@@ -5376,11 +5591,7 @@
             <a:pPr lvl="1"/>
             <a:r>
               <a:rPr lang="en-US" sz="2400" dirty="0" smtClean="0"/>
-              <a:t>Multiple a</a:t>
-            </a:r>
-            <a:r>
-              <a:rPr lang="en-US" sz="2400" dirty="0" smtClean="0"/>
-              <a:t>ddressing. single master – multiple slaves</a:t>
+              <a:t>Multiple addressing. single master – multiple slaves</a:t>
             </a:r>
           </a:p>
           <a:p>
@@ -5389,7 +5600,6 @@
               <a:rPr lang="en-US" sz="2400" dirty="0" smtClean="0"/>
               <a:t>Repeated starts</a:t>
             </a:r>
-            <a:endParaRPr lang="en-US" sz="2400" dirty="0" smtClean="0"/>
           </a:p>
           <a:p>
             <a:pPr lvl="1"/>
@@ -5397,18 +5607,12 @@
               <a:rPr lang="en-US" sz="2400" dirty="0" smtClean="0"/>
               <a:t>Register initialization</a:t>
             </a:r>
-            <a:endParaRPr lang="en-US" sz="2400" dirty="0" smtClean="0"/>
           </a:p>
           <a:p>
             <a:r>
               <a:rPr lang="en-US" sz="2400" dirty="0" smtClean="0"/>
-              <a:t>Serial Peripheral Interface (SPI</a:t>
-            </a:r>
-            <a:r>
-              <a:rPr lang="en-US" sz="2400" dirty="0" smtClean="0"/>
-              <a:t>) – Backup plan</a:t>
-            </a:r>
-            <a:endParaRPr lang="en-US" sz="2400" dirty="0" smtClean="0"/>
+              <a:t>Serial Peripheral Interface (SPI) – Backup plan</a:t>
+            </a:r>
           </a:p>
           <a:p>
             <a:pPr lvl="1"/>
@@ -5418,13 +5622,8 @@
             </a:r>
             <a:r>
               <a:rPr lang="en-US" sz="2400" dirty="0" smtClean="0"/>
-              <a:t>o a</a:t>
-            </a:r>
-            <a:r>
-              <a:rPr lang="en-US" sz="2400" dirty="0" smtClean="0"/>
-              <a:t>ddressing. single master – single slave</a:t>
-            </a:r>
-            <a:endParaRPr lang="en-US" sz="2400" dirty="0" smtClean="0"/>
+              <a:t>o addressing. single master – single slave</a:t>
+            </a:r>
           </a:p>
           <a:p>
             <a:r>
@@ -5512,10 +5711,9 @@
           <a:bodyPr/>
           <a:lstStyle/>
           <a:p>
-            <a:pPr algn="ctr"/>
             <a:r>
               <a:rPr lang="en-US" dirty="0" smtClean="0"/>
-              <a:t>Triangulation Algorithm</a:t>
+              <a:t>IR Camera Printed Circuit Board</a:t>
             </a:r>
             <a:endParaRPr lang="en-US" dirty="0"/>
           </a:p>
@@ -5533,32 +5731,104 @@
         </p:nvSpPr>
         <p:spPr/>
         <p:txBody>
-          <a:bodyPr>
-            <a:normAutofit/>
-          </a:bodyPr>
+          <a:bodyPr/>
           <a:lstStyle/>
           <a:p>
-            <a:endParaRPr lang="en-US" sz="2400" dirty="0"/>
-          </a:p>
-        </p:txBody>
-      </p:sp>
+            <a:r>
+              <a:rPr lang="en-US" dirty="0" smtClean="0"/>
+              <a:t>Smaller</a:t>
+            </a:r>
+          </a:p>
+          <a:p>
+            <a:r>
+              <a:rPr lang="en-US" dirty="0" smtClean="0"/>
+              <a:t>More reliable</a:t>
+            </a:r>
+          </a:p>
+          <a:p>
+            <a:r>
+              <a:rPr lang="en-US" dirty="0" smtClean="0"/>
+              <a:t>Mounting Holes</a:t>
+            </a:r>
+          </a:p>
+          <a:p>
+            <a:endParaRPr lang="en-US" dirty="0"/>
+          </a:p>
+        </p:txBody>
+      </p:sp>
+      <p:pic>
+        <p:nvPicPr>
+          <p:cNvPr id="2050" name="Picture 2"/>
+          <p:cNvPicPr>
+            <a:picLocks noChangeAspect="1" noChangeArrowheads="1"/>
+          </p:cNvPicPr>
+          <p:nvPr/>
+        </p:nvPicPr>
+        <p:blipFill>
+          <a:blip r:embed="rId2">
+            <a:extLst>
+              <a:ext uri="{BEBA8EAE-BF5A-486C-A8C5-ECC9F3942E4B}">
+                <a14:imgProps xmlns:a14="http://schemas.microsoft.com/office/drawing/2010/main">
+                  <a14:imgLayer r:embed="rId3">
+                    <a14:imgEffect>
+                      <a14:backgroundRemoval t="10000" b="90000" l="10000" r="90000"/>
+                    </a14:imgEffect>
+                  </a14:imgLayer>
+                </a14:imgProps>
+              </a:ext>
+              <a:ext uri="{28A0092B-C50C-407E-A947-70E740481C1C}">
+                <a14:useLocalDpi xmlns:a14="http://schemas.microsoft.com/office/drawing/2010/main" val="0"/>
+              </a:ext>
+            </a:extLst>
+          </a:blip>
+          <a:srcRect/>
+          <a:stretch>
+            <a:fillRect/>
+          </a:stretch>
+        </p:blipFill>
+        <p:spPr bwMode="auto">
+          <a:xfrm>
+            <a:off x="381000" y="685800"/>
+            <a:ext cx="10528761" cy="7010400"/>
+          </a:xfrm>
+          <a:prstGeom prst="rect">
+            <a:avLst/>
+          </a:prstGeom>
+          <a:noFill/>
+          <a:ln>
+            <a:noFill/>
+          </a:ln>
+          <a:extLst>
+            <a:ext uri="{909E8E84-426E-40DD-AFC4-6F175D3DCCD1}">
+              <a14:hiddenFill xmlns:a14="http://schemas.microsoft.com/office/drawing/2010/main">
+                <a:solidFill>
+                  <a:schemeClr val="accent1"/>
+                </a:solidFill>
+              </a14:hiddenFill>
+            </a:ext>
+            <a:ext uri="{91240B29-F687-4F45-9708-019B960494DF}">
+              <a14:hiddenLine xmlns:a14="http://schemas.microsoft.com/office/drawing/2010/main" w="9525">
+                <a:solidFill>
+                  <a:schemeClr val="tx1"/>
+                </a:solidFill>
+                <a:miter lim="800000"/>
+                <a:headEnd/>
+                <a:tailEnd/>
+              </a14:hiddenLine>
+            </a:ext>
+          </a:extLst>
+        </p:spPr>
+      </p:pic>
     </p:spTree>
     <p:extLst>
       <p:ext uri="{BB962C8B-B14F-4D97-AF65-F5344CB8AC3E}">
-        <p14:creationId xmlns:p14="http://schemas.microsoft.com/office/powerpoint/2010/main" val="3541308890"/>
+        <p14:creationId xmlns:p14="http://schemas.microsoft.com/office/powerpoint/2010/main" val="4010982495"/>
       </p:ext>
     </p:extLst>
   </p:cSld>
   <p:clrMapOvr>
     <a:masterClrMapping/>
   </p:clrMapOvr>
-  <p:timing>
-    <p:tnLst>
-      <p:par>
-        <p:cTn id="1" dur="indefinite" restart="never" nodeType="tmRoot"/>
-      </p:par>
-    </p:tnLst>
-  </p:timing>
 </p:sld>
 </file>
 
@@ -5597,7 +5867,7 @@
             <a:pPr algn="ctr"/>
             <a:r>
               <a:rPr lang="en-US" dirty="0" smtClean="0"/>
-              <a:t>Potential problems</a:t>
+              <a:t>Triangulation Algorithm</a:t>
             </a:r>
             <a:endParaRPr lang="en-US" dirty="0"/>
           </a:p>
@@ -5621,41 +5891,25 @@
           <a:lstStyle/>
           <a:p>
             <a:r>
-              <a:rPr lang="en-US" sz="2400" dirty="0" smtClean="0"/>
-              <a:t>Infrared White-out</a:t>
-            </a:r>
-          </a:p>
-          <a:p>
-            <a:r>
-              <a:rPr lang="en-US" sz="2400" dirty="0" smtClean="0"/>
-              <a:t>Carrying Capacity</a:t>
-            </a:r>
-          </a:p>
-          <a:p>
-            <a:r>
-              <a:rPr lang="en-US" sz="2400" dirty="0" smtClean="0"/>
-              <a:t>Viewing Angles</a:t>
-            </a:r>
-          </a:p>
-          <a:p>
-            <a:r>
-              <a:rPr lang="en-US" sz="2400" dirty="0" smtClean="0"/>
-              <a:t>Simulation/Testing area</a:t>
-            </a:r>
-          </a:p>
-          <a:p>
-            <a:r>
-              <a:rPr lang="en-US" sz="2400" smtClean="0"/>
-              <a:t>Weather</a:t>
-            </a:r>
-            <a:endParaRPr lang="en-US" sz="2400" dirty="0" smtClean="0"/>
+              <a:rPr lang="en-US" sz="2400" dirty="0"/>
+              <a:t>The triangulation algorithm allows the quad copter to determine its position over a landing pad with IR LEDs imbedded. The algorithm takes a set of two X,Y positions as inputs and outputs the quad copters </a:t>
+            </a:r>
+            <a:r>
+              <a:rPr lang="en-US" sz="2400" dirty="0" err="1"/>
+              <a:t>x,y</a:t>
+            </a:r>
+            <a:r>
+              <a:rPr lang="en-US" sz="2400" dirty="0"/>
+              <a:t> offset and elevation. The algorithm runs on the APM board in a 100Hz loop.</a:t>
+            </a:r>
+            <a:endParaRPr lang="en-US" sz="2400" dirty="0"/>
           </a:p>
         </p:txBody>
       </p:sp>
     </p:spTree>
     <p:extLst>
       <p:ext uri="{BB962C8B-B14F-4D97-AF65-F5344CB8AC3E}">
-        <p14:creationId xmlns:p14="http://schemas.microsoft.com/office/powerpoint/2010/main" val="2536010797"/>
+        <p14:creationId xmlns:p14="http://schemas.microsoft.com/office/powerpoint/2010/main" val="3541308890"/>
       </p:ext>
     </p:extLst>
   </p:cSld>
@@ -5704,12 +5958,7 @@
           <a:bodyPr/>
           <a:lstStyle/>
           <a:p>
-            <a:pPr algn="ctr"/>
-            <a:r>
-              <a:rPr lang="en-US" dirty="0" smtClean="0"/>
-              <a:t>Budget</a:t>
-            </a:r>
-            <a:endParaRPr lang="en-US" dirty="0"/>
+            <a:endParaRPr lang="en-US"/>
           </a:p>
         </p:txBody>
       </p:sp>
@@ -5725,60 +5974,87 @@
         </p:nvSpPr>
         <p:spPr/>
         <p:txBody>
-          <a:bodyPr>
-            <a:normAutofit/>
-          </a:bodyPr>
+          <a:bodyPr/>
           <a:lstStyle/>
           <a:p>
-            <a:r>
-              <a:rPr lang="en-US" sz="2400" dirty="0" smtClean="0"/>
-              <a:t>Total budget of $50 per team member</a:t>
-            </a:r>
-          </a:p>
-          <a:p>
-            <a:r>
-              <a:rPr lang="en-US" sz="2400" dirty="0" smtClean="0"/>
-              <a:t>Estimated costs: </a:t>
-            </a:r>
-            <a:r>
-              <a:rPr lang="en-US" sz="2400" dirty="0" smtClean="0"/>
-              <a:t>~$225</a:t>
-            </a:r>
-            <a:endParaRPr lang="en-US" sz="2400" dirty="0" smtClean="0"/>
-          </a:p>
-          <a:p>
-            <a:r>
-              <a:rPr lang="en-US" sz="2400" dirty="0" smtClean="0"/>
-              <a:t>Unexpected costs: </a:t>
-            </a:r>
-            <a:r>
-              <a:rPr lang="en-US" sz="2400" dirty="0" smtClean="0"/>
-              <a:t>~$25</a:t>
-            </a:r>
-            <a:endParaRPr lang="en-US" sz="2400" dirty="0" smtClean="0"/>
-          </a:p>
-          <a:p>
-            <a:endParaRPr lang="en-US" sz="2400" dirty="0"/>
-          </a:p>
-        </p:txBody>
-      </p:sp>
+            <a:endParaRPr lang="en-US"/>
+          </a:p>
+        </p:txBody>
+      </p:sp>
+      <p:pic>
+        <p:nvPicPr>
+          <p:cNvPr id="1026" name="Picture 2"/>
+          <p:cNvPicPr>
+            <a:picLocks noChangeAspect="1" noChangeArrowheads="1"/>
+          </p:cNvPicPr>
+          <p:nvPr/>
+        </p:nvPicPr>
+        <p:blipFill>
+          <a:blip r:embed="rId2">
+            <a:extLst>
+              <a:ext uri="{28A0092B-C50C-407E-A947-70E740481C1C}">
+                <a14:useLocalDpi xmlns:a14="http://schemas.microsoft.com/office/drawing/2010/main" val="0"/>
+              </a:ext>
+            </a:extLst>
+          </a:blip>
+          <a:srcRect/>
+          <a:stretch>
+            <a:fillRect/>
+          </a:stretch>
+        </p:blipFill>
+        <p:spPr bwMode="auto">
+          <a:xfrm>
+            <a:off x="838200" y="152400"/>
+            <a:ext cx="7310841" cy="6553200"/>
+          </a:xfrm>
+          <a:prstGeom prst="rect">
+            <a:avLst/>
+          </a:prstGeom>
+          <a:noFill/>
+          <a:ln>
+            <a:noFill/>
+          </a:ln>
+          <a:effectLst/>
+          <a:extLst>
+            <a:ext uri="{909E8E84-426E-40DD-AFC4-6F175D3DCCD1}">
+              <a14:hiddenFill xmlns:a14="http://schemas.microsoft.com/office/drawing/2010/main">
+                <a:solidFill>
+                  <a:schemeClr val="accent1"/>
+                </a:solidFill>
+              </a14:hiddenFill>
+            </a:ext>
+            <a:ext uri="{91240B29-F687-4F45-9708-019B960494DF}">
+              <a14:hiddenLine xmlns:a14="http://schemas.microsoft.com/office/drawing/2010/main" w="9525">
+                <a:solidFill>
+                  <a:schemeClr val="tx1"/>
+                </a:solidFill>
+                <a:miter lim="800000"/>
+                <a:headEnd/>
+                <a:tailEnd/>
+              </a14:hiddenLine>
+            </a:ext>
+            <a:ext uri="{AF507438-7753-43E0-B8FC-AC1667EBCBE1}">
+              <a14:hiddenEffects xmlns:a14="http://schemas.microsoft.com/office/drawing/2010/main">
+                <a:effectLst>
+                  <a:outerShdw dist="35921" dir="2700000" algn="ctr" rotWithShape="0">
+                    <a:schemeClr val="bg2"/>
+                  </a:outerShdw>
+                </a:effectLst>
+              </a14:hiddenEffects>
+            </a:ext>
+          </a:extLst>
+        </p:spPr>
+      </p:pic>
     </p:spTree>
     <p:extLst>
       <p:ext uri="{BB962C8B-B14F-4D97-AF65-F5344CB8AC3E}">
-        <p14:creationId xmlns:p14="http://schemas.microsoft.com/office/powerpoint/2010/main" val="1111726868"/>
+        <p14:creationId xmlns:p14="http://schemas.microsoft.com/office/powerpoint/2010/main" val="4117839303"/>
       </p:ext>
     </p:extLst>
   </p:cSld>
   <p:clrMapOvr>
     <a:masterClrMapping/>
   </p:clrMapOvr>
-  <p:timing>
-    <p:tnLst>
-      <p:par>
-        <p:cTn id="1" dur="indefinite" restart="never" nodeType="tmRoot"/>
-      </p:par>
-    </p:tnLst>
-  </p:timing>
 </p:sld>
 </file>
 
@@ -5817,7 +6093,7 @@
             <a:pPr algn="ctr"/>
             <a:r>
               <a:rPr lang="en-US" dirty="0" smtClean="0"/>
-              <a:t>timeline</a:t>
+              <a:t>Potential problems</a:t>
             </a:r>
             <a:endParaRPr lang="en-US" dirty="0"/>
           </a:p>
@@ -5842,50 +6118,40 @@
           <a:p>
             <a:r>
               <a:rPr lang="en-US" sz="2400" dirty="0" smtClean="0"/>
-              <a:t>Proposal: January 22</a:t>
+              <a:t>Infrared White-out</a:t>
             </a:r>
           </a:p>
           <a:p>
             <a:r>
               <a:rPr lang="en-US" sz="2400" dirty="0" smtClean="0"/>
-              <a:t>Cycle 1: March 6</a:t>
-            </a:r>
-          </a:p>
-          <a:p>
-            <a:pPr lvl="1"/>
+              <a:t>Carrying Capacity</a:t>
+            </a:r>
+          </a:p>
+          <a:p>
             <a:r>
               <a:rPr lang="en-US" sz="2400" dirty="0" smtClean="0"/>
-              <a:t>Working control algorithm</a:t>
+              <a:t>Viewing Angles</a:t>
+            </a:r>
+          </a:p>
+          <a:p>
+            <a:r>
+              <a:rPr lang="en-US" sz="2400" dirty="0" smtClean="0"/>
+              <a:t>Simulation/Testing area</a:t>
+            </a:r>
+          </a:p>
+          <a:p>
+            <a:r>
+              <a:rPr lang="en-US" sz="2400" smtClean="0"/>
+              <a:t>Weather</a:t>
             </a:r>
             <a:endParaRPr lang="en-US" sz="2400" dirty="0" smtClean="0"/>
-          </a:p>
-          <a:p>
-            <a:r>
-              <a:rPr lang="en-US" sz="2400" dirty="0" smtClean="0"/>
-              <a:t>Cycle 2: April 25</a:t>
-            </a:r>
-          </a:p>
-          <a:p>
-            <a:pPr lvl="1"/>
-            <a:r>
-              <a:rPr lang="en-US" sz="2400" dirty="0" smtClean="0"/>
-              <a:t>Final design report by April 18</a:t>
-            </a:r>
-          </a:p>
-          <a:p>
-            <a:pPr lvl="1"/>
-            <a:r>
-              <a:rPr lang="en-US" sz="2400" dirty="0" smtClean="0"/>
-              <a:t>Senior Design Fair: April 25</a:t>
-            </a:r>
-            <a:endParaRPr lang="en-US" sz="2400" dirty="0"/>
           </a:p>
         </p:txBody>
       </p:sp>
     </p:spTree>
     <p:extLst>
       <p:ext uri="{BB962C8B-B14F-4D97-AF65-F5344CB8AC3E}">
-        <p14:creationId xmlns:p14="http://schemas.microsoft.com/office/powerpoint/2010/main" val="2327637867"/>
+        <p14:creationId xmlns:p14="http://schemas.microsoft.com/office/powerpoint/2010/main" val="2536010797"/>
       </p:ext>
     </p:extLst>
   </p:cSld>

</xml_diff>

<commit_message>
Grammatical edit to presentation
</commit_message>
<xml_diff>
--- a/docs/Cycle 1/Cycle1Presentation.pptx
+++ b/docs/Cycle 1/Cycle1Presentation.pptx
@@ -26,14 +26,14 @@
       <p:regular r:id="rId14"/>
     </p:embeddedFont>
     <p:embeddedFont>
-      <p:font typeface="Calibri" panose="020F0502020204030204" pitchFamily="34" charset="0"/>
+      <p:font typeface="Arial Narrow" panose="020B0606020202030204" pitchFamily="34" charset="0"/>
       <p:regular r:id="rId15"/>
       <p:bold r:id="rId16"/>
       <p:italic r:id="rId17"/>
       <p:boldItalic r:id="rId18"/>
     </p:embeddedFont>
     <p:embeddedFont>
-      <p:font typeface="Arial Narrow" panose="020B0606020202030204" pitchFamily="34" charset="0"/>
+      <p:font typeface="Calibri" panose="020F0502020204030204" pitchFamily="34" charset="0"/>
       <p:regular r:id="rId19"/>
       <p:bold r:id="rId20"/>
       <p:italic r:id="rId21"/>
@@ -5927,8 +5927,16 @@
           <a:p>
             <a:pPr lvl="1"/>
             <a:r>
+              <a:rPr lang="en-US" sz="2400"/>
+              <a:t>No </a:t>
+            </a:r>
+            <a:r>
+              <a:rPr lang="en-US" sz="2400" smtClean="0"/>
+              <a:t>addressing: </a:t>
+            </a:r>
+            <a:r>
               <a:rPr lang="en-US" sz="2400" dirty="0"/>
-              <a:t>No addressing. single master – single slave</a:t>
+              <a:t>single master – single slave</a:t>
             </a:r>
           </a:p>
           <a:p>
@@ -5960,6 +5968,13 @@
   <p:clrMapOvr>
     <a:masterClrMapping/>
   </p:clrMapOvr>
+  <p:timing>
+    <p:tnLst>
+      <p:par>
+        <p:cTn id="1" dur="indefinite" restart="never" nodeType="tmRoot"/>
+      </p:par>
+    </p:tnLst>
+  </p:timing>
 </p:sld>
 </file>
 
@@ -6113,6 +6128,13 @@
   <p:clrMapOvr>
     <a:masterClrMapping/>
   </p:clrMapOvr>
+  <p:timing>
+    <p:tnLst>
+      <p:par>
+        <p:cTn id="1" dur="indefinite" restart="never" nodeType="tmRoot"/>
+      </p:par>
+    </p:tnLst>
+  </p:timing>
 </p:sld>
 </file>
 
@@ -6338,6 +6360,13 @@
   <p:clrMapOvr>
     <a:masterClrMapping/>
   </p:clrMapOvr>
+  <p:timing>
+    <p:tnLst>
+      <p:par>
+        <p:cTn id="1" dur="indefinite" restart="never" nodeType="tmRoot"/>
+      </p:par>
+    </p:tnLst>
+  </p:timing>
 </p:sld>
 </file>
 

</xml_diff>